<commit_message>
update UGDG for select, next and previous commands
</commit_message>
<xml_diff>
--- a/docs/diagrams/NextSequenceDiagram.pptx
+++ b/docs/diagrams/NextSequenceDiagram.pptx
@@ -209,7 +209,7 @@
           <a:p>
             <a:fld id="{F5CC4B3F-88C1-4FFA-B1B6-F41C21DC6924}" type="datetimeFigureOut">
               <a:rPr lang="en-US" smtClean="0"/>
-              <a:t>10/29/2018</a:t>
+              <a:t>11/1/2018</a:t>
             </a:fld>
             <a:endParaRPr lang="en-US"/>
           </a:p>
@@ -655,7 +655,7 @@
           <a:p>
             <a:fld id="{78C97017-6FC3-485B-9764-EAC9E56C1D49}" type="datetimeFigureOut">
               <a:rPr lang="en-US" smtClean="0"/>
-              <a:t>10/29/2018</a:t>
+              <a:t>11/1/2018</a:t>
             </a:fld>
             <a:endParaRPr lang="en-US"/>
           </a:p>
@@ -823,7 +823,7 @@
           <a:p>
             <a:fld id="{78C97017-6FC3-485B-9764-EAC9E56C1D49}" type="datetimeFigureOut">
               <a:rPr lang="en-US" smtClean="0"/>
-              <a:t>10/29/2018</a:t>
+              <a:t>11/1/2018</a:t>
             </a:fld>
             <a:endParaRPr lang="en-US"/>
           </a:p>
@@ -1001,7 +1001,7 @@
           <a:p>
             <a:fld id="{78C97017-6FC3-485B-9764-EAC9E56C1D49}" type="datetimeFigureOut">
               <a:rPr lang="en-US" smtClean="0"/>
-              <a:t>10/29/2018</a:t>
+              <a:t>11/1/2018</a:t>
             </a:fld>
             <a:endParaRPr lang="en-US"/>
           </a:p>
@@ -1169,7 +1169,7 @@
           <a:p>
             <a:fld id="{78C97017-6FC3-485B-9764-EAC9E56C1D49}" type="datetimeFigureOut">
               <a:rPr lang="en-US" smtClean="0"/>
-              <a:t>10/29/2018</a:t>
+              <a:t>11/1/2018</a:t>
             </a:fld>
             <a:endParaRPr lang="en-US"/>
           </a:p>
@@ -1414,7 +1414,7 @@
           <a:p>
             <a:fld id="{78C97017-6FC3-485B-9764-EAC9E56C1D49}" type="datetimeFigureOut">
               <a:rPr lang="en-US" smtClean="0"/>
-              <a:t>10/29/2018</a:t>
+              <a:t>11/1/2018</a:t>
             </a:fld>
             <a:endParaRPr lang="en-US"/>
           </a:p>
@@ -1699,7 +1699,7 @@
           <a:p>
             <a:fld id="{78C97017-6FC3-485B-9764-EAC9E56C1D49}" type="datetimeFigureOut">
               <a:rPr lang="en-US" smtClean="0"/>
-              <a:t>10/29/2018</a:t>
+              <a:t>11/1/2018</a:t>
             </a:fld>
             <a:endParaRPr lang="en-US"/>
           </a:p>
@@ -2118,7 +2118,7 @@
           <a:p>
             <a:fld id="{78C97017-6FC3-485B-9764-EAC9E56C1D49}" type="datetimeFigureOut">
               <a:rPr lang="en-US" smtClean="0"/>
-              <a:t>10/29/2018</a:t>
+              <a:t>11/1/2018</a:t>
             </a:fld>
             <a:endParaRPr lang="en-US"/>
           </a:p>
@@ -2235,7 +2235,7 @@
           <a:p>
             <a:fld id="{78C97017-6FC3-485B-9764-EAC9E56C1D49}" type="datetimeFigureOut">
               <a:rPr lang="en-US" smtClean="0"/>
-              <a:t>10/29/2018</a:t>
+              <a:t>11/1/2018</a:t>
             </a:fld>
             <a:endParaRPr lang="en-US"/>
           </a:p>
@@ -2330,7 +2330,7 @@
           <a:p>
             <a:fld id="{78C97017-6FC3-485B-9764-EAC9E56C1D49}" type="datetimeFigureOut">
               <a:rPr lang="en-US" smtClean="0"/>
-              <a:t>10/29/2018</a:t>
+              <a:t>11/1/2018</a:t>
             </a:fld>
             <a:endParaRPr lang="en-US"/>
           </a:p>
@@ -2605,7 +2605,7 @@
           <a:p>
             <a:fld id="{78C97017-6FC3-485B-9764-EAC9E56C1D49}" type="datetimeFigureOut">
               <a:rPr lang="en-US" smtClean="0"/>
-              <a:t>10/29/2018</a:t>
+              <a:t>11/1/2018</a:t>
             </a:fld>
             <a:endParaRPr lang="en-US"/>
           </a:p>
@@ -2857,7 +2857,7 @@
           <a:p>
             <a:fld id="{78C97017-6FC3-485B-9764-EAC9E56C1D49}" type="datetimeFigureOut">
               <a:rPr lang="en-US" smtClean="0"/>
-              <a:t>10/29/2018</a:t>
+              <a:t>11/1/2018</a:t>
             </a:fld>
             <a:endParaRPr lang="en-US"/>
           </a:p>
@@ -3068,7 +3068,7 @@
           <a:p>
             <a:fld id="{78C97017-6FC3-485B-9764-EAC9E56C1D49}" type="datetimeFigureOut">
               <a:rPr lang="en-US" smtClean="0"/>
-              <a:t>10/29/2018</a:t>
+              <a:t>11/1/2018</a:t>
             </a:fld>
             <a:endParaRPr lang="en-US"/>
           </a:p>
@@ -3452,7 +3452,7 @@
         <p:spPr>
           <a:xfrm>
             <a:off x="6485114" y="163019"/>
-            <a:ext cx="3227206" cy="5247181"/>
+            <a:ext cx="3681800" cy="5247181"/>
           </a:xfrm>
           <a:prstGeom prst="roundRect">
             <a:avLst>
@@ -3679,8 +3679,8 @@
         </p:nvSpPr>
         <p:spPr>
           <a:xfrm>
-            <a:off x="1530029" y="1258311"/>
-            <a:ext cx="161322" cy="3847087"/>
+            <a:off x="1536941" y="1258312"/>
+            <a:ext cx="154409" cy="3151094"/>
           </a:xfrm>
           <a:prstGeom prst="rect">
             <a:avLst/>
@@ -3726,8 +3726,8 @@
         </p:nvSpPr>
         <p:spPr>
           <a:xfrm>
-            <a:off x="3437188" y="423022"/>
-            <a:ext cx="1219200" cy="467684"/>
+            <a:off x="3437187" y="423022"/>
+            <a:ext cx="1455625" cy="467684"/>
           </a:xfrm>
           <a:prstGeom prst="rect">
             <a:avLst/>
@@ -3767,18 +3767,15 @@
                   <a:schemeClr val="bg1"/>
                 </a:solidFill>
               </a:rPr>
-              <a:t>:Address</a:t>
-            </a:r>
-          </a:p>
-          <a:p>
-            <a:pPr algn="ctr"/>
+              <a:t>:</a:t>
+            </a:r>
             <a:r>
               <a:rPr lang="en-US" sz="1600" dirty="0" err="1">
                 <a:solidFill>
                   <a:schemeClr val="bg1"/>
                 </a:solidFill>
               </a:rPr>
-              <a:t>BookParser</a:t>
+              <a:t>PiconsoParser</a:t>
             </a:r>
             <a:endParaRPr lang="en-SG" sz="1600" dirty="0">
               <a:solidFill>
@@ -4209,7 +4206,7 @@
         </p:nvCxnSpPr>
         <p:spPr>
           <a:xfrm>
-            <a:off x="380999" y="5105400"/>
+            <a:off x="380999" y="4406444"/>
             <a:ext cx="1196051" cy="0"/>
           </a:xfrm>
           <a:prstGeom prst="straightConnector1">
@@ -4247,8 +4244,8 @@
         </p:nvSpPr>
         <p:spPr>
           <a:xfrm>
-            <a:off x="5526488" y="2731313"/>
-            <a:ext cx="151794" cy="2178489"/>
+            <a:off x="5526488" y="2731314"/>
+            <a:ext cx="149717" cy="1479530"/>
           </a:xfrm>
           <a:prstGeom prst="rect">
             <a:avLst/>
@@ -4288,14 +4285,14 @@
       </p:sp>
       <p:sp>
         <p:nvSpPr>
-          <p:cNvPr id="79" name="TextBox 78"/>
+          <p:cNvPr id="80" name="TextBox 79"/>
           <p:cNvSpPr txBox="1"/>
           <p:nvPr/>
         </p:nvSpPr>
         <p:spPr>
           <a:xfrm>
-            <a:off x="5650150" y="2748246"/>
-            <a:ext cx="1512650" cy="184666"/>
+            <a:off x="1885189" y="1106150"/>
+            <a:ext cx="1899551" cy="215444"/>
           </a:xfrm>
           <a:prstGeom prst="rect">
             <a:avLst/>
@@ -4320,37 +4317,26 @@
           </a:lstStyle>
           <a:p>
             <a:r>
-              <a:rPr lang="en-US" sz="1200" dirty="0" err="1">
-                <a:solidFill>
-                  <a:schemeClr val="accent4">
-                    <a:lumMod val="75000"/>
-                  </a:schemeClr>
-                </a:solidFill>
-              </a:rPr>
-              <a:t>getDirectoryImageList</a:t>
-            </a:r>
-            <a:r>
-              <a:rPr lang="en-US" sz="1200" dirty="0">
-                <a:solidFill>
-                  <a:srgbClr val="7030A0"/>
-                </a:solidFill>
-              </a:rPr>
-              <a:t>()</a:t>
-            </a:r>
-            <a:endParaRPr lang="en-US" sz="1200" dirty="0"/>
-          </a:p>
-        </p:txBody>
-      </p:sp>
-      <p:sp>
-        <p:nvSpPr>
-          <p:cNvPr id="80" name="TextBox 79"/>
+              <a:rPr lang="en-US" dirty="0" err="1"/>
+              <a:t>parseCommand</a:t>
+            </a:r>
+            <a:r>
+              <a:rPr lang="en-US" dirty="0"/>
+              <a:t>(“next”)</a:t>
+            </a:r>
+          </a:p>
+        </p:txBody>
+      </p:sp>
+      <p:sp>
+        <p:nvSpPr>
+          <p:cNvPr id="82" name="TextBox 81"/>
           <p:cNvSpPr txBox="1"/>
           <p:nvPr/>
         </p:nvSpPr>
         <p:spPr>
           <a:xfrm>
-            <a:off x="1885189" y="1106150"/>
-            <a:ext cx="1899551" cy="215444"/>
+            <a:off x="3272755" y="3962400"/>
+            <a:ext cx="621216" cy="215444"/>
           </a:xfrm>
           <a:prstGeom prst="rect">
             <a:avLst/>
@@ -4375,26 +4361,22 @@
           </a:lstStyle>
           <a:p>
             <a:r>
-              <a:rPr lang="en-US" dirty="0" err="1"/>
-              <a:t>parseCommand</a:t>
-            </a:r>
-            <a:r>
               <a:rPr lang="en-US" dirty="0"/>
-              <a:t>(“next”)</a:t>
-            </a:r>
-          </a:p>
-        </p:txBody>
-      </p:sp>
-      <p:sp>
-        <p:nvSpPr>
-          <p:cNvPr id="82" name="TextBox 81"/>
+              <a:t>result</a:t>
+            </a:r>
+          </a:p>
+        </p:txBody>
+      </p:sp>
+      <p:sp>
+        <p:nvSpPr>
+          <p:cNvPr id="83" name="TextBox 82"/>
           <p:cNvSpPr txBox="1"/>
           <p:nvPr/>
         </p:nvSpPr>
         <p:spPr>
           <a:xfrm>
-            <a:off x="3272755" y="4661356"/>
-            <a:ext cx="621216" cy="215444"/>
+            <a:off x="645270" y="4161345"/>
+            <a:ext cx="762000" cy="215444"/>
           </a:xfrm>
           <a:prstGeom prst="rect">
             <a:avLst/>
@@ -4427,14 +4409,81 @@
       </p:sp>
       <p:sp>
         <p:nvSpPr>
-          <p:cNvPr id="83" name="TextBox 82"/>
+          <p:cNvPr id="84" name="Rectangle 62"/>
+          <p:cNvSpPr/>
+          <p:nvPr/>
+        </p:nvSpPr>
+        <p:spPr>
+          <a:xfrm>
+            <a:off x="8458941" y="1213753"/>
+            <a:ext cx="1294659" cy="244173"/>
+          </a:xfrm>
+          <a:prstGeom prst="rect">
+            <a:avLst/>
+          </a:prstGeom>
+          <a:solidFill>
+            <a:srgbClr val="7030A0"/>
+          </a:solidFill>
+          <a:ln w="19050">
+            <a:solidFill>
+              <a:srgbClr val="7030A0"/>
+            </a:solidFill>
+          </a:ln>
+          <a:effectLst/>
+        </p:spPr>
+        <p:style>
+          <a:lnRef idx="1">
+            <a:schemeClr val="accent2"/>
+          </a:lnRef>
+          <a:fillRef idx="2">
+            <a:schemeClr val="accent2"/>
+          </a:fillRef>
+          <a:effectRef idx="1">
+            <a:schemeClr val="accent2"/>
+          </a:effectRef>
+          <a:fontRef idx="minor">
+            <a:schemeClr val="dk1"/>
+          </a:fontRef>
+        </p:style>
+        <p:txBody>
+          <a:bodyPr rtlCol="0" anchor="ctr"/>
+          <a:lstStyle/>
+          <a:p>
+            <a:pPr algn="ctr"/>
+            <a:r>
+              <a:rPr lang="en-US" sz="1600" dirty="0">
+                <a:solidFill>
+                  <a:schemeClr val="bg1"/>
+                </a:solidFill>
+              </a:rPr>
+              <a:t>:</a:t>
+            </a:r>
+            <a:r>
+              <a:rPr lang="en-US" sz="1600" dirty="0" err="1">
+                <a:solidFill>
+                  <a:schemeClr val="bg1"/>
+                </a:solidFill>
+              </a:rPr>
+              <a:t>UserPrefs</a:t>
+            </a:r>
+            <a:endParaRPr lang="en-SG" sz="1600" dirty="0">
+              <a:solidFill>
+                <a:schemeClr val="bg1"/>
+              </a:solidFill>
+            </a:endParaRPr>
+          </a:p>
+        </p:txBody>
+      </p:sp>
+      <p:sp>
+        <p:nvSpPr>
+          <p:cNvPr id="93" name="TextBox 92"/>
           <p:cNvSpPr txBox="1"/>
           <p:nvPr/>
         </p:nvSpPr>
         <p:spPr>
           <a:xfrm>
-            <a:off x="645270" y="4860301"/>
-            <a:ext cx="762000" cy="215444"/>
+            <a:off x="2724792" y="1905793"/>
+            <a:ext cx="389018" cy="215444"/>
           </a:xfrm>
           <a:prstGeom prst="rect">
             <a:avLst/>
@@ -4460,21 +4509,21 @@
           <a:p>
             <a:r>
               <a:rPr lang="en-US" dirty="0"/>
-              <a:t>result</a:t>
-            </a:r>
-          </a:p>
-        </p:txBody>
-      </p:sp>
-      <p:sp>
-        <p:nvSpPr>
-          <p:cNvPr id="84" name="Rectangle 62"/>
+              <a:t>next</a:t>
+            </a:r>
+          </a:p>
+        </p:txBody>
+      </p:sp>
+      <p:sp>
+        <p:nvSpPr>
+          <p:cNvPr id="40" name="Rectangle 62"/>
           <p:cNvSpPr/>
           <p:nvPr/>
         </p:nvSpPr>
         <p:spPr>
           <a:xfrm>
-            <a:off x="8156835" y="2438400"/>
-            <a:ext cx="1294659" cy="244173"/>
+            <a:off x="7083906" y="1137553"/>
+            <a:ext cx="841636" cy="300180"/>
           </a:xfrm>
           <a:prstGeom prst="rect">
             <a:avLst/>
@@ -4514,160 +4563,6 @@
                   <a:schemeClr val="bg1"/>
                 </a:solidFill>
               </a:rPr>
-              <a:t>:</a:t>
-            </a:r>
-            <a:r>
-              <a:rPr lang="en-US" sz="1600" dirty="0" err="1">
-                <a:solidFill>
-                  <a:schemeClr val="bg1"/>
-                </a:solidFill>
-              </a:rPr>
-              <a:t>UserPrefs</a:t>
-            </a:r>
-            <a:endParaRPr lang="en-SG" sz="1600" dirty="0">
-              <a:solidFill>
-                <a:schemeClr val="bg1"/>
-              </a:solidFill>
-            </a:endParaRPr>
-          </a:p>
-        </p:txBody>
-      </p:sp>
-      <p:sp>
-        <p:nvSpPr>
-          <p:cNvPr id="86" name="Rectangle 85"/>
-          <p:cNvSpPr/>
-          <p:nvPr/>
-        </p:nvSpPr>
-        <p:spPr>
-          <a:xfrm>
-            <a:off x="8731904" y="3010906"/>
-            <a:ext cx="141935" cy="195819"/>
-          </a:xfrm>
-          <a:prstGeom prst="rect">
-            <a:avLst/>
-          </a:prstGeom>
-          <a:solidFill>
-            <a:srgbClr val="7030A0"/>
-          </a:solidFill>
-          <a:ln>
-            <a:solidFill>
-              <a:srgbClr val="7030A0"/>
-            </a:solidFill>
-          </a:ln>
-          <a:effectLst/>
-        </p:spPr>
-        <p:style>
-          <a:lnRef idx="1">
-            <a:schemeClr val="accent3"/>
-          </a:lnRef>
-          <a:fillRef idx="2">
-            <a:schemeClr val="accent3"/>
-          </a:fillRef>
-          <a:effectRef idx="1">
-            <a:schemeClr val="accent3"/>
-          </a:effectRef>
-          <a:fontRef idx="minor">
-            <a:schemeClr val="dk1"/>
-          </a:fontRef>
-        </p:style>
-        <p:txBody>
-          <a:bodyPr rtlCol="0" anchor="ctr"/>
-          <a:lstStyle/>
-          <a:p>
-            <a:pPr algn="ctr"/>
-            <a:endParaRPr lang="en-SG" sz="1400" dirty="0"/>
-          </a:p>
-        </p:txBody>
-      </p:sp>
-      <p:sp>
-        <p:nvSpPr>
-          <p:cNvPr id="93" name="TextBox 92"/>
-          <p:cNvSpPr txBox="1"/>
-          <p:nvPr/>
-        </p:nvSpPr>
-        <p:spPr>
-          <a:xfrm>
-            <a:off x="2724792" y="1905793"/>
-            <a:ext cx="389018" cy="215444"/>
-          </a:xfrm>
-          <a:prstGeom prst="rect">
-            <a:avLst/>
-          </a:prstGeom>
-          <a:noFill/>
-        </p:spPr>
-        <p:txBody>
-          <a:bodyPr wrap="square" lIns="0" tIns="0" rIns="0" bIns="0" rtlCol="0">
-            <a:spAutoFit/>
-          </a:bodyPr>
-          <a:lstStyle>
-            <a:defPPr>
-              <a:defRPr lang="en-US"/>
-            </a:defPPr>
-            <a:lvl1pPr algn="r">
-              <a:defRPr sz="1400">
-                <a:solidFill>
-                  <a:srgbClr val="0070C0"/>
-                </a:solidFill>
-              </a:defRPr>
-            </a:lvl1pPr>
-          </a:lstStyle>
-          <a:p>
-            <a:r>
-              <a:rPr lang="en-US" dirty="0"/>
-              <a:t>next</a:t>
-            </a:r>
-          </a:p>
-        </p:txBody>
-      </p:sp>
-      <p:sp>
-        <p:nvSpPr>
-          <p:cNvPr id="40" name="Rectangle 62"/>
-          <p:cNvSpPr/>
-          <p:nvPr/>
-        </p:nvSpPr>
-        <p:spPr>
-          <a:xfrm>
-            <a:off x="6781800" y="2362200"/>
-            <a:ext cx="841636" cy="300180"/>
-          </a:xfrm>
-          <a:prstGeom prst="rect">
-            <a:avLst/>
-          </a:prstGeom>
-          <a:solidFill>
-            <a:srgbClr val="7030A0"/>
-          </a:solidFill>
-          <a:ln w="19050">
-            <a:solidFill>
-              <a:srgbClr val="7030A0"/>
-            </a:solidFill>
-          </a:ln>
-          <a:effectLst/>
-        </p:spPr>
-        <p:style>
-          <a:lnRef idx="1">
-            <a:schemeClr val="accent2"/>
-          </a:lnRef>
-          <a:fillRef idx="2">
-            <a:schemeClr val="accent2"/>
-          </a:fillRef>
-          <a:effectRef idx="1">
-            <a:schemeClr val="accent2"/>
-          </a:effectRef>
-          <a:fontRef idx="minor">
-            <a:schemeClr val="dk1"/>
-          </a:fontRef>
-        </p:style>
-        <p:txBody>
-          <a:bodyPr rtlCol="0" anchor="ctr"/>
-          <a:lstStyle/>
-          <a:p>
-            <a:pPr algn="ctr"/>
-            <a:r>
-              <a:rPr lang="en-US" sz="1600" dirty="0">
-                <a:solidFill>
-                  <a:schemeClr val="bg1"/>
-                </a:solidFill>
-              </a:rPr>
               <a:t>: Model</a:t>
             </a:r>
             <a:endParaRPr lang="en-SG" sz="1600" dirty="0">
@@ -4688,7 +4583,7 @@
         </p:nvCxnSpPr>
         <p:spPr>
           <a:xfrm>
-            <a:off x="7222486" y="2653306"/>
+            <a:off x="7524592" y="1428659"/>
             <a:ext cx="2486" cy="2417965"/>
           </a:xfrm>
           <a:prstGeom prst="line">
@@ -4714,91 +4609,6 @@
           </a:effectRef>
           <a:fontRef idx="minor">
             <a:schemeClr val="dk1"/>
-          </a:fontRef>
-        </p:style>
-      </p:cxnSp>
-      <p:sp>
-        <p:nvSpPr>
-          <p:cNvPr id="49" name="Rectangle 48"/>
-          <p:cNvSpPr/>
-          <p:nvPr/>
-        </p:nvSpPr>
-        <p:spPr>
-          <a:xfrm>
-            <a:off x="7119562" y="2958107"/>
-            <a:ext cx="152505" cy="375718"/>
-          </a:xfrm>
-          <a:prstGeom prst="rect">
-            <a:avLst/>
-          </a:prstGeom>
-          <a:solidFill>
-            <a:srgbClr val="7030A0"/>
-          </a:solidFill>
-          <a:ln>
-            <a:solidFill>
-              <a:srgbClr val="7030A0"/>
-            </a:solidFill>
-          </a:ln>
-          <a:effectLst/>
-        </p:spPr>
-        <p:style>
-          <a:lnRef idx="1">
-            <a:schemeClr val="accent3"/>
-          </a:lnRef>
-          <a:fillRef idx="2">
-            <a:schemeClr val="accent3"/>
-          </a:fillRef>
-          <a:effectRef idx="1">
-            <a:schemeClr val="accent3"/>
-          </a:effectRef>
-          <a:fontRef idx="minor">
-            <a:schemeClr val="dk1"/>
-          </a:fontRef>
-        </p:style>
-        <p:txBody>
-          <a:bodyPr rtlCol="0" anchor="ctr"/>
-          <a:lstStyle/>
-          <a:p>
-            <a:pPr algn="ctr"/>
-            <a:endParaRPr lang="en-SG" sz="1400"/>
-          </a:p>
-        </p:txBody>
-      </p:sp>
-      <p:cxnSp>
-        <p:nvCxnSpPr>
-          <p:cNvPr id="50" name="Straight Arrow Connector 49"/>
-          <p:cNvCxnSpPr>
-            <a:cxnSpLocks/>
-          </p:cNvCxnSpPr>
-          <p:nvPr/>
-        </p:nvCxnSpPr>
-        <p:spPr>
-          <a:xfrm>
-            <a:off x="5685755" y="2975344"/>
-            <a:ext cx="1433807" cy="0"/>
-          </a:xfrm>
-          <a:prstGeom prst="straightConnector1">
-            <a:avLst/>
-          </a:prstGeom>
-          <a:ln w="19050">
-            <a:solidFill>
-              <a:srgbClr val="0070C0"/>
-            </a:solidFill>
-            <a:tailEnd type="arrow"/>
-          </a:ln>
-        </p:spPr>
-        <p:style>
-          <a:lnRef idx="1">
-            <a:schemeClr val="accent1"/>
-          </a:lnRef>
-          <a:fillRef idx="0">
-            <a:schemeClr val="accent1"/>
-          </a:fillRef>
-          <a:effectRef idx="0">
-            <a:schemeClr val="accent1"/>
-          </a:effectRef>
-          <a:fontRef idx="minor">
-            <a:schemeClr val="tx1"/>
           </a:fontRef>
         </p:style>
       </p:cxnSp>
@@ -5013,7 +4823,7 @@
         </p:nvCxnSpPr>
         <p:spPr>
           <a:xfrm>
-            <a:off x="1691351" y="4909802"/>
+            <a:off x="1691351" y="4210846"/>
             <a:ext cx="3831517" cy="0"/>
           </a:xfrm>
           <a:prstGeom prst="straightConnector1">
@@ -5059,7 +4869,7 @@
         </p:nvCxnSpPr>
         <p:spPr>
           <a:xfrm>
-            <a:off x="8808483" y="2642997"/>
+            <a:off x="9100407" y="1457926"/>
             <a:ext cx="9138" cy="2428274"/>
           </a:xfrm>
           <a:prstGeom prst="line">
@@ -5090,14 +4900,117 @@
       </p:cxnSp>
       <p:sp>
         <p:nvSpPr>
-          <p:cNvPr id="41" name="TextBox 40"/>
+          <p:cNvPr id="54" name="Rectangle 53">
+            <a:extLst>
+              <a:ext uri="{FF2B5EF4-FFF2-40B4-BE49-F238E27FC236}">
+                <a16:creationId xmlns:a16="http://schemas.microsoft.com/office/drawing/2014/main" id="{89CA0E73-D056-42E5-88A3-4CD2AA6A492D}"/>
+              </a:ext>
+            </a:extLst>
+          </p:cNvPr>
+          <p:cNvSpPr/>
+          <p:nvPr/>
+        </p:nvSpPr>
+        <p:spPr>
+          <a:xfrm>
+            <a:off x="7424346" y="3124035"/>
+            <a:ext cx="152505" cy="375718"/>
+          </a:xfrm>
+          <a:prstGeom prst="rect">
+            <a:avLst/>
+          </a:prstGeom>
+          <a:solidFill>
+            <a:srgbClr val="7030A0"/>
+          </a:solidFill>
+          <a:ln>
+            <a:solidFill>
+              <a:srgbClr val="7030A0"/>
+            </a:solidFill>
+          </a:ln>
+          <a:effectLst/>
+        </p:spPr>
+        <p:style>
+          <a:lnRef idx="1">
+            <a:schemeClr val="accent3"/>
+          </a:lnRef>
+          <a:fillRef idx="2">
+            <a:schemeClr val="accent3"/>
+          </a:fillRef>
+          <a:effectRef idx="1">
+            <a:schemeClr val="accent3"/>
+          </a:effectRef>
+          <a:fontRef idx="minor">
+            <a:schemeClr val="dk1"/>
+          </a:fontRef>
+        </p:style>
+        <p:txBody>
+          <a:bodyPr rtlCol="0" anchor="ctr"/>
+          <a:lstStyle/>
+          <a:p>
+            <a:pPr algn="ctr"/>
+            <a:endParaRPr lang="en-SG" sz="1400"/>
+          </a:p>
+        </p:txBody>
+      </p:sp>
+      <p:cxnSp>
+        <p:nvCxnSpPr>
+          <p:cNvPr id="55" name="Straight Arrow Connector 54">
+            <a:extLst>
+              <a:ext uri="{FF2B5EF4-FFF2-40B4-BE49-F238E27FC236}">
+                <a16:creationId xmlns:a16="http://schemas.microsoft.com/office/drawing/2014/main" id="{FF72696D-5412-4E4B-9C96-7F57AE42A008}"/>
+              </a:ext>
+            </a:extLst>
+          </p:cNvPr>
+          <p:cNvCxnSpPr>
+            <a:cxnSpLocks/>
+          </p:cNvCxnSpPr>
+          <p:nvPr/>
+        </p:nvCxnSpPr>
+        <p:spPr>
+          <a:xfrm>
+            <a:off x="5685755" y="3147213"/>
+            <a:ext cx="1738591" cy="0"/>
+          </a:xfrm>
+          <a:prstGeom prst="straightConnector1">
+            <a:avLst/>
+          </a:prstGeom>
+          <a:ln w="19050">
+            <a:solidFill>
+              <a:srgbClr val="0070C0"/>
+            </a:solidFill>
+            <a:tailEnd type="arrow"/>
+          </a:ln>
+        </p:spPr>
+        <p:style>
+          <a:lnRef idx="1">
+            <a:schemeClr val="accent1"/>
+          </a:lnRef>
+          <a:fillRef idx="0">
+            <a:schemeClr val="accent1"/>
+          </a:fillRef>
+          <a:effectRef idx="0">
+            <a:schemeClr val="accent1"/>
+          </a:effectRef>
+          <a:fontRef idx="minor">
+            <a:schemeClr val="tx1"/>
+          </a:fontRef>
+        </p:style>
+      </p:cxnSp>
+      <p:sp>
+        <p:nvSpPr>
+          <p:cNvPr id="57" name="TextBox 56">
+            <a:extLst>
+              <a:ext uri="{FF2B5EF4-FFF2-40B4-BE49-F238E27FC236}">
+                <a16:creationId xmlns:a16="http://schemas.microsoft.com/office/drawing/2014/main" id="{96963441-FA23-489A-AC06-849CB59F8636}"/>
+              </a:ext>
+            </a:extLst>
+          </p:cNvPr>
           <p:cNvSpPr txBox="1"/>
           <p:nvPr/>
         </p:nvSpPr>
         <p:spPr>
           <a:xfrm>
-            <a:off x="7471035" y="2819400"/>
-            <a:ext cx="1175072" cy="184666"/>
+            <a:off x="5715000" y="2851469"/>
+            <a:ext cx="1795181" cy="184666"/>
           </a:xfrm>
           <a:prstGeom prst="rect">
             <a:avLst/>
@@ -5124,344 +5037,30 @@
             </a:lvl1pPr>
           </a:lstStyle>
           <a:p>
+            <a:pPr algn="just"/>
             <a:r>
               <a:rPr lang="en-US" sz="1200" dirty="0" err="1">
                 <a:solidFill>
                   <a:srgbClr val="7030A0"/>
                 </a:solidFill>
               </a:rPr>
-              <a:t>getAllImages</a:t>
+              <a:t>updateImageListNextBatch</a:t>
             </a:r>
             <a:r>
               <a:rPr lang="en-US" sz="1200" dirty="0">
-                <a:solidFill>
-                  <a:schemeClr val="accent4">
-                    <a:lumMod val="75000"/>
-                  </a:schemeClr>
-                </a:solidFill>
-              </a:rPr>
-              <a:t>()</a:t>
-            </a:r>
-          </a:p>
-        </p:txBody>
-      </p:sp>
-      <p:cxnSp>
-        <p:nvCxnSpPr>
-          <p:cNvPr id="52" name="Straight Arrow Connector 51"/>
-          <p:cNvCxnSpPr>
-            <a:cxnSpLocks/>
-          </p:cNvCxnSpPr>
-          <p:nvPr/>
-        </p:nvCxnSpPr>
-        <p:spPr>
-          <a:xfrm>
-            <a:off x="7276026" y="3026895"/>
-            <a:ext cx="1470216" cy="0"/>
-          </a:xfrm>
-          <a:prstGeom prst="straightConnector1">
-            <a:avLst/>
-          </a:prstGeom>
-          <a:ln w="19050">
-            <a:solidFill>
-              <a:srgbClr val="7030A0"/>
-            </a:solidFill>
-            <a:tailEnd type="arrow"/>
-          </a:ln>
-        </p:spPr>
-        <p:style>
-          <a:lnRef idx="1">
-            <a:schemeClr val="accent1"/>
-          </a:lnRef>
-          <a:fillRef idx="0">
-            <a:schemeClr val="accent1"/>
-          </a:fillRef>
-          <a:effectRef idx="0">
-            <a:schemeClr val="accent1"/>
-          </a:effectRef>
-          <a:fontRef idx="minor">
-            <a:schemeClr val="tx1"/>
-          </a:fontRef>
-        </p:style>
-      </p:cxnSp>
-      <p:cxnSp>
-        <p:nvCxnSpPr>
-          <p:cNvPr id="60" name="Straight Arrow Connector 59">
-            <a:extLst>
-              <a:ext uri="{FF2B5EF4-FFF2-40B4-BE49-F238E27FC236}">
-                <a16:creationId xmlns:a16="http://schemas.microsoft.com/office/drawing/2014/main" id="{7C9F21BC-13A9-471F-825A-2621FD36355F}"/>
-              </a:ext>
-            </a:extLst>
-          </p:cNvPr>
-          <p:cNvCxnSpPr>
-            <a:cxnSpLocks/>
-          </p:cNvCxnSpPr>
-          <p:nvPr/>
-        </p:nvCxnSpPr>
-        <p:spPr>
-          <a:xfrm flipV="1">
-            <a:off x="7276026" y="3200400"/>
-            <a:ext cx="1470216" cy="6325"/>
-          </a:xfrm>
-          <a:prstGeom prst="straightConnector1">
-            <a:avLst/>
-          </a:prstGeom>
-          <a:ln w="19050">
-            <a:solidFill>
-              <a:srgbClr val="7030A0"/>
-            </a:solidFill>
-            <a:prstDash val="sysDash"/>
-            <a:headEnd type="arrow" w="med" len="med"/>
-            <a:tailEnd type="none" w="med" len="med"/>
-          </a:ln>
-        </p:spPr>
-        <p:style>
-          <a:lnRef idx="1">
-            <a:schemeClr val="accent1"/>
-          </a:lnRef>
-          <a:fillRef idx="0">
-            <a:schemeClr val="accent1"/>
-          </a:fillRef>
-          <a:effectRef idx="0">
-            <a:schemeClr val="accent1"/>
-          </a:effectRef>
-          <a:fontRef idx="minor">
-            <a:schemeClr val="tx1"/>
-          </a:fontRef>
-        </p:style>
-      </p:cxnSp>
-      <p:cxnSp>
-        <p:nvCxnSpPr>
-          <p:cNvPr id="63" name="Straight Arrow Connector 62">
-            <a:extLst>
-              <a:ext uri="{FF2B5EF4-FFF2-40B4-BE49-F238E27FC236}">
-                <a16:creationId xmlns:a16="http://schemas.microsoft.com/office/drawing/2014/main" id="{7C9F21BC-13A9-471F-825A-2621FD36355F}"/>
-              </a:ext>
-            </a:extLst>
-          </p:cNvPr>
-          <p:cNvCxnSpPr>
-            <a:cxnSpLocks/>
-            <a:endCxn id="49" idx="2"/>
-          </p:cNvCxnSpPr>
-          <p:nvPr/>
-        </p:nvCxnSpPr>
-        <p:spPr>
-          <a:xfrm>
-            <a:off x="5685755" y="3333825"/>
-            <a:ext cx="1510060" cy="0"/>
-          </a:xfrm>
-          <a:prstGeom prst="straightConnector1">
-            <a:avLst/>
-          </a:prstGeom>
-          <a:ln w="19050">
-            <a:solidFill>
-              <a:srgbClr val="7030A0"/>
-            </a:solidFill>
-            <a:prstDash val="sysDash"/>
-            <a:headEnd type="arrow" w="med" len="med"/>
-            <a:tailEnd type="none" w="med" len="med"/>
-          </a:ln>
-        </p:spPr>
-        <p:style>
-          <a:lnRef idx="1">
-            <a:schemeClr val="accent1"/>
-          </a:lnRef>
-          <a:fillRef idx="0">
-            <a:schemeClr val="accent1"/>
-          </a:fillRef>
-          <a:effectRef idx="0">
-            <a:schemeClr val="accent1"/>
-          </a:effectRef>
-          <a:fontRef idx="minor">
-            <a:schemeClr val="tx1"/>
-          </a:fontRef>
-        </p:style>
-      </p:cxnSp>
-      <p:sp>
-        <p:nvSpPr>
-          <p:cNvPr id="54" name="Rectangle 53">
-            <a:extLst>
-              <a:ext uri="{FF2B5EF4-FFF2-40B4-BE49-F238E27FC236}">
-                <a16:creationId xmlns:a16="http://schemas.microsoft.com/office/drawing/2014/main" id="{89CA0E73-D056-42E5-88A3-4CD2AA6A492D}"/>
-              </a:ext>
-            </a:extLst>
-          </p:cNvPr>
-          <p:cNvSpPr/>
-          <p:nvPr/>
-        </p:nvSpPr>
-        <p:spPr>
-          <a:xfrm>
-            <a:off x="7122240" y="4348682"/>
-            <a:ext cx="152505" cy="375718"/>
-          </a:xfrm>
-          <a:prstGeom prst="rect">
-            <a:avLst/>
-          </a:prstGeom>
-          <a:solidFill>
-            <a:srgbClr val="7030A0"/>
-          </a:solidFill>
-          <a:ln>
-            <a:solidFill>
-              <a:srgbClr val="7030A0"/>
-            </a:solidFill>
-          </a:ln>
-          <a:effectLst/>
-        </p:spPr>
-        <p:style>
-          <a:lnRef idx="1">
-            <a:schemeClr val="accent3"/>
-          </a:lnRef>
-          <a:fillRef idx="2">
-            <a:schemeClr val="accent3"/>
-          </a:fillRef>
-          <a:effectRef idx="1">
-            <a:schemeClr val="accent3"/>
-          </a:effectRef>
-          <a:fontRef idx="minor">
-            <a:schemeClr val="dk1"/>
-          </a:fontRef>
-        </p:style>
-        <p:txBody>
-          <a:bodyPr rtlCol="0" anchor="ctr"/>
-          <a:lstStyle/>
-          <a:p>
-            <a:pPr algn="ctr"/>
-            <a:endParaRPr lang="en-SG" sz="1400"/>
-          </a:p>
-        </p:txBody>
-      </p:sp>
-      <p:cxnSp>
-        <p:nvCxnSpPr>
-          <p:cNvPr id="55" name="Straight Arrow Connector 54">
-            <a:extLst>
-              <a:ext uri="{FF2B5EF4-FFF2-40B4-BE49-F238E27FC236}">
-                <a16:creationId xmlns:a16="http://schemas.microsoft.com/office/drawing/2014/main" id="{FF72696D-5412-4E4B-9C96-7F57AE42A008}"/>
-              </a:ext>
-            </a:extLst>
-          </p:cNvPr>
-          <p:cNvCxnSpPr>
-            <a:cxnSpLocks/>
-          </p:cNvCxnSpPr>
-          <p:nvPr/>
-        </p:nvCxnSpPr>
-        <p:spPr>
-          <a:xfrm>
-            <a:off x="5685755" y="4371860"/>
-            <a:ext cx="1433807" cy="0"/>
-          </a:xfrm>
-          <a:prstGeom prst="straightConnector1">
-            <a:avLst/>
-          </a:prstGeom>
-          <a:ln w="19050">
-            <a:solidFill>
-              <a:srgbClr val="0070C0"/>
-            </a:solidFill>
-            <a:tailEnd type="arrow"/>
-          </a:ln>
-        </p:spPr>
-        <p:style>
-          <a:lnRef idx="1">
-            <a:schemeClr val="accent1"/>
-          </a:lnRef>
-          <a:fillRef idx="0">
-            <a:schemeClr val="accent1"/>
-          </a:fillRef>
-          <a:effectRef idx="0">
-            <a:schemeClr val="accent1"/>
-          </a:effectRef>
-          <a:fontRef idx="minor">
-            <a:schemeClr val="tx1"/>
-          </a:fontRef>
-        </p:style>
-      </p:cxnSp>
-      <p:sp>
-        <p:nvSpPr>
-          <p:cNvPr id="57" name="TextBox 56">
-            <a:extLst>
-              <a:ext uri="{FF2B5EF4-FFF2-40B4-BE49-F238E27FC236}">
-                <a16:creationId xmlns:a16="http://schemas.microsoft.com/office/drawing/2014/main" id="{96963441-FA23-489A-AC06-849CB59F8636}"/>
-              </a:ext>
-            </a:extLst>
-          </p:cNvPr>
-          <p:cNvSpPr txBox="1"/>
-          <p:nvPr/>
-        </p:nvSpPr>
-        <p:spPr>
-          <a:xfrm>
-            <a:off x="5952911" y="3968312"/>
-            <a:ext cx="1368152" cy="369332"/>
-          </a:xfrm>
-          <a:prstGeom prst="rect">
-            <a:avLst/>
-          </a:prstGeom>
-          <a:noFill/>
-          <a:ln>
-            <a:noFill/>
-          </a:ln>
-        </p:spPr>
-        <p:txBody>
-          <a:bodyPr wrap="square" lIns="0" tIns="0" rIns="0" bIns="0" rtlCol="0">
-            <a:spAutoFit/>
-          </a:bodyPr>
-          <a:lstStyle>
-            <a:defPPr>
-              <a:defRPr lang="en-US"/>
-            </a:defPPr>
-            <a:lvl1pPr algn="r">
-              <a:defRPr sz="1400">
-                <a:solidFill>
-                  <a:srgbClr val="0070C0"/>
-                </a:solidFill>
-              </a:defRPr>
-            </a:lvl1pPr>
-          </a:lstStyle>
-          <a:p>
-            <a:pPr algn="just"/>
-            <a:r>
-              <a:rPr lang="en-US" sz="1200" dirty="0" err="1">
                 <a:solidFill>
                   <a:srgbClr val="7030A0"/>
                 </a:solidFill>
               </a:rPr>
-              <a:t>updateImageList</a:t>
+              <a:t>()</a:t>
             </a:r>
             <a:endParaRPr lang="en-US" sz="1200" dirty="0">
               <a:solidFill>
-                <a:srgbClr val="7030A0"/>
+                <a:schemeClr val="accent4">
+                  <a:lumMod val="75000"/>
+                </a:schemeClr>
               </a:solidFill>
             </a:endParaRPr>
-          </a:p>
-          <a:p>
-            <a:pPr algn="just"/>
-            <a:r>
-              <a:rPr lang="en-US" sz="1200" dirty="0">
-                <a:solidFill>
-                  <a:schemeClr val="accent4">
-                    <a:lumMod val="75000"/>
-                  </a:schemeClr>
-                </a:solidFill>
-              </a:rPr>
-              <a:t>(</a:t>
-            </a:r>
-            <a:r>
-              <a:rPr lang="en-US" sz="1200" dirty="0" err="1">
-                <a:solidFill>
-                  <a:schemeClr val="accent4">
-                    <a:lumMod val="75000"/>
-                  </a:schemeClr>
-                </a:solidFill>
-              </a:rPr>
-              <a:t>ArrayList</a:t>
-            </a:r>
-            <a:r>
-              <a:rPr lang="en-US" sz="1200" dirty="0">
-                <a:solidFill>
-                  <a:schemeClr val="accent4">
-                    <a:lumMod val="75000"/>
-                  </a:schemeClr>
-                </a:solidFill>
-              </a:rPr>
-              <a:t>&lt;Path&gt;)</a:t>
-            </a:r>
           </a:p>
         </p:txBody>
       </p:sp>
@@ -5481,7 +5080,7 @@
         </p:nvCxnSpPr>
         <p:spPr>
           <a:xfrm>
-            <a:off x="7278704" y="4417470"/>
+            <a:off x="7580810" y="3192823"/>
             <a:ext cx="1470216" cy="0"/>
           </a:xfrm>
           <a:prstGeom prst="straightConnector1">
@@ -5525,7 +5124,7 @@
         </p:nvCxnSpPr>
         <p:spPr>
           <a:xfrm flipV="1">
-            <a:off x="7278704" y="4590975"/>
+            <a:off x="7580810" y="3366328"/>
             <a:ext cx="1470216" cy="6325"/>
           </a:xfrm>
           <a:prstGeom prst="straightConnector1">
@@ -5572,8 +5171,8 @@
         </p:nvCxnSpPr>
         <p:spPr>
           <a:xfrm>
-            <a:off x="5685755" y="4724400"/>
-            <a:ext cx="1512738" cy="0"/>
+            <a:off x="5685755" y="3499753"/>
+            <a:ext cx="1814844" cy="0"/>
           </a:xfrm>
           <a:prstGeom prst="straightConnector1">
             <a:avLst/>
@@ -5616,7 +5215,7 @@
         </p:nvSpPr>
         <p:spPr>
           <a:xfrm>
-            <a:off x="8731903" y="4423892"/>
+            <a:off x="9034009" y="3199245"/>
             <a:ext cx="141935" cy="195819"/>
           </a:xfrm>
           <a:prstGeom prst="rect">
@@ -5657,57 +5256,10 @@
       </p:sp>
       <p:sp>
         <p:nvSpPr>
-          <p:cNvPr id="24" name="Rectangle 23">
+          <p:cNvPr id="72" name="TextBox 71">
             <a:extLst>
               <a:ext uri="{FF2B5EF4-FFF2-40B4-BE49-F238E27FC236}">
-                <a16:creationId xmlns:a16="http://schemas.microsoft.com/office/drawing/2014/main" id="{45912D00-2CF1-4580-9F76-17B3F3BA02D7}"/>
-              </a:ext>
-            </a:extLst>
-          </p:cNvPr>
-          <p:cNvSpPr/>
-          <p:nvPr/>
-        </p:nvSpPr>
-        <p:spPr>
-          <a:xfrm>
-            <a:off x="4267200" y="3411322"/>
-            <a:ext cx="5029200" cy="1353386"/>
-          </a:xfrm>
-          <a:prstGeom prst="rect">
-            <a:avLst/>
-          </a:prstGeom>
-          <a:noFill/>
-        </p:spPr>
-        <p:style>
-          <a:lnRef idx="2">
-            <a:schemeClr val="accent1">
-              <a:shade val="50000"/>
-            </a:schemeClr>
-          </a:lnRef>
-          <a:fillRef idx="1">
-            <a:schemeClr val="accent1"/>
-          </a:fillRef>
-          <a:effectRef idx="0">
-            <a:schemeClr val="accent1"/>
-          </a:effectRef>
-          <a:fontRef idx="minor">
-            <a:schemeClr val="lt1"/>
-          </a:fontRef>
-        </p:style>
-        <p:txBody>
-          <a:bodyPr rtlCol="0" anchor="ctr"/>
-          <a:lstStyle/>
-          <a:p>
-            <a:pPr algn="ctr"/>
-            <a:endParaRPr lang="en-SG"/>
-          </a:p>
-        </p:txBody>
-      </p:sp>
-      <p:sp>
-        <p:nvSpPr>
-          <p:cNvPr id="32" name="TextBox 31">
-            <a:extLst>
-              <a:ext uri="{FF2B5EF4-FFF2-40B4-BE49-F238E27FC236}">
-                <a16:creationId xmlns:a16="http://schemas.microsoft.com/office/drawing/2014/main" id="{A50659C5-B41E-47DE-B520-5B9E76BB9592}"/>
+                <a16:creationId xmlns:a16="http://schemas.microsoft.com/office/drawing/2014/main" id="{0A09E897-CD87-4F80-B3DB-8AD1584BBFB6}"/>
               </a:ext>
             </a:extLst>
           </p:cNvPr>
@@ -5716,83 +5268,8 @@
         </p:nvSpPr>
         <p:spPr>
           <a:xfrm>
-            <a:off x="4267200" y="3418804"/>
-            <a:ext cx="414313" cy="276999"/>
-          </a:xfrm>
-          <a:prstGeom prst="rect">
-            <a:avLst/>
-          </a:prstGeom>
-          <a:noFill/>
-          <a:ln w="28575">
-            <a:solidFill>
-              <a:schemeClr val="tx2"/>
-            </a:solidFill>
-          </a:ln>
-        </p:spPr>
-        <p:txBody>
-          <a:bodyPr wrap="square" rtlCol="0">
-            <a:spAutoFit/>
-          </a:bodyPr>
-          <a:lstStyle/>
-          <a:p>
-            <a:r>
-              <a:rPr lang="en-SG" sz="1200" dirty="0"/>
-              <a:t>opt</a:t>
-            </a:r>
-          </a:p>
-        </p:txBody>
-      </p:sp>
-      <p:sp>
-        <p:nvSpPr>
-          <p:cNvPr id="33" name="TextBox 32">
-            <a:extLst>
-              <a:ext uri="{FF2B5EF4-FFF2-40B4-BE49-F238E27FC236}">
-                <a16:creationId xmlns:a16="http://schemas.microsoft.com/office/drawing/2014/main" id="{D534193E-E902-4C34-8911-47BF735E523F}"/>
-              </a:ext>
-            </a:extLst>
-          </p:cNvPr>
-          <p:cNvSpPr txBox="1"/>
-          <p:nvPr/>
-        </p:nvSpPr>
-        <p:spPr>
-          <a:xfrm>
-            <a:off x="4198756" y="3689753"/>
-            <a:ext cx="1037463" cy="261610"/>
-          </a:xfrm>
-          <a:prstGeom prst="rect">
-            <a:avLst/>
-          </a:prstGeom>
-          <a:noFill/>
-        </p:spPr>
-        <p:txBody>
-          <a:bodyPr wrap="none" rtlCol="0">
-            <a:spAutoFit/>
-          </a:bodyPr>
-          <a:lstStyle/>
-          <a:p>
-            <a:r>
-              <a:rPr lang="en-SG" sz="1050" dirty="0"/>
-              <a:t>[&gt;BATCH_SIZE]</a:t>
-            </a:r>
-          </a:p>
-        </p:txBody>
-      </p:sp>
-      <p:sp>
-        <p:nvSpPr>
-          <p:cNvPr id="70" name="TextBox 69">
-            <a:extLst>
-              <a:ext uri="{FF2B5EF4-FFF2-40B4-BE49-F238E27FC236}">
-                <a16:creationId xmlns:a16="http://schemas.microsoft.com/office/drawing/2014/main" id="{71789678-FA88-472F-B21F-5D6CD28BC9C7}"/>
-              </a:ext>
-            </a:extLst>
-          </p:cNvPr>
-          <p:cNvSpPr txBox="1"/>
-          <p:nvPr/>
-        </p:nvSpPr>
-        <p:spPr>
-          <a:xfrm>
-            <a:off x="7584938" y="4034092"/>
-            <a:ext cx="1368152" cy="369332"/>
+            <a:off x="7855333" y="2775942"/>
+            <a:ext cx="1099482" cy="369332"/>
           </a:xfrm>
           <a:prstGeom prst="rect">
             <a:avLst/>
@@ -5826,207 +5303,23 @@
                   <a:srgbClr val="7030A0"/>
                 </a:solidFill>
               </a:rPr>
-              <a:t>updateImageList</a:t>
+              <a:t>updateImageListNextBatch</a:t>
+            </a:r>
+            <a:r>
+              <a:rPr lang="en-US" sz="1200" dirty="0">
+                <a:solidFill>
+                  <a:srgbClr val="7030A0"/>
+                </a:solidFill>
+              </a:rPr>
+              <a:t>()</a:t>
             </a:r>
             <a:endParaRPr lang="en-US" sz="1200" dirty="0">
               <a:solidFill>
-                <a:srgbClr val="7030A0"/>
+                <a:schemeClr val="accent4">
+                  <a:lumMod val="75000"/>
+                </a:schemeClr>
               </a:solidFill>
             </a:endParaRPr>
-          </a:p>
-          <a:p>
-            <a:pPr algn="just"/>
-            <a:r>
-              <a:rPr lang="en-US" sz="1200" dirty="0">
-                <a:solidFill>
-                  <a:schemeClr val="accent4">
-                    <a:lumMod val="75000"/>
-                  </a:schemeClr>
-                </a:solidFill>
-              </a:rPr>
-              <a:t>(</a:t>
-            </a:r>
-            <a:r>
-              <a:rPr lang="en-US" sz="1200" dirty="0" err="1">
-                <a:solidFill>
-                  <a:schemeClr val="accent4">
-                    <a:lumMod val="75000"/>
-                  </a:schemeClr>
-                </a:solidFill>
-              </a:rPr>
-              <a:t>ArrayList</a:t>
-            </a:r>
-            <a:r>
-              <a:rPr lang="en-US" sz="1200" dirty="0">
-                <a:solidFill>
-                  <a:schemeClr val="accent4">
-                    <a:lumMod val="75000"/>
-                  </a:schemeClr>
-                </a:solidFill>
-              </a:rPr>
-              <a:t>&lt;Path&gt;)</a:t>
-            </a:r>
-          </a:p>
-        </p:txBody>
-      </p:sp>
-      <p:sp>
-        <p:nvSpPr>
-          <p:cNvPr id="53" name="Rectangle 52">
-            <a:extLst>
-              <a:ext uri="{FF2B5EF4-FFF2-40B4-BE49-F238E27FC236}">
-                <a16:creationId xmlns:a16="http://schemas.microsoft.com/office/drawing/2014/main" id="{1878CF81-B74F-4A59-B40D-F4C9C2591B24}"/>
-              </a:ext>
-            </a:extLst>
-          </p:cNvPr>
-          <p:cNvSpPr/>
-          <p:nvPr/>
-        </p:nvSpPr>
-        <p:spPr>
-          <a:xfrm>
-            <a:off x="5105400" y="3482212"/>
-            <a:ext cx="1758516" cy="429304"/>
-          </a:xfrm>
-          <a:prstGeom prst="rect">
-            <a:avLst/>
-          </a:prstGeom>
-          <a:noFill/>
-        </p:spPr>
-        <p:style>
-          <a:lnRef idx="2">
-            <a:schemeClr val="accent1">
-              <a:shade val="50000"/>
-            </a:schemeClr>
-          </a:lnRef>
-          <a:fillRef idx="1">
-            <a:schemeClr val="accent1"/>
-          </a:fillRef>
-          <a:effectRef idx="0">
-            <a:schemeClr val="accent1"/>
-          </a:effectRef>
-          <a:fontRef idx="minor">
-            <a:schemeClr val="lt1"/>
-          </a:fontRef>
-        </p:style>
-        <p:txBody>
-          <a:bodyPr rtlCol="0" anchor="ctr"/>
-          <a:lstStyle/>
-          <a:p>
-            <a:pPr algn="ctr"/>
-            <a:endParaRPr lang="en-SG"/>
-          </a:p>
-        </p:txBody>
-      </p:sp>
-      <p:sp>
-        <p:nvSpPr>
-          <p:cNvPr id="64" name="TextBox 63">
-            <a:extLst>
-              <a:ext uri="{FF2B5EF4-FFF2-40B4-BE49-F238E27FC236}">
-                <a16:creationId xmlns:a16="http://schemas.microsoft.com/office/drawing/2014/main" id="{3702DF41-075C-436C-8CDF-898B5D8C23E3}"/>
-              </a:ext>
-            </a:extLst>
-          </p:cNvPr>
-          <p:cNvSpPr txBox="1"/>
-          <p:nvPr/>
-        </p:nvSpPr>
-        <p:spPr>
-          <a:xfrm>
-            <a:off x="5115635" y="3479431"/>
-            <a:ext cx="443116" cy="253916"/>
-          </a:xfrm>
-          <a:prstGeom prst="rect">
-            <a:avLst/>
-          </a:prstGeom>
-          <a:noFill/>
-          <a:ln w="28575">
-            <a:solidFill>
-              <a:schemeClr val="tx2"/>
-            </a:solidFill>
-          </a:ln>
-        </p:spPr>
-        <p:txBody>
-          <a:bodyPr wrap="square" rtlCol="0">
-            <a:spAutoFit/>
-          </a:bodyPr>
-          <a:lstStyle/>
-          <a:p>
-            <a:r>
-              <a:rPr lang="en-SG" sz="1050" dirty="0"/>
-              <a:t>loop</a:t>
-            </a:r>
-          </a:p>
-        </p:txBody>
-      </p:sp>
-      <p:sp>
-        <p:nvSpPr>
-          <p:cNvPr id="68" name="TextBox 67">
-            <a:extLst>
-              <a:ext uri="{FF2B5EF4-FFF2-40B4-BE49-F238E27FC236}">
-                <a16:creationId xmlns:a16="http://schemas.microsoft.com/office/drawing/2014/main" id="{E0F5CDE5-BFEF-4AC0-8F5E-3E174810B4FB}"/>
-              </a:ext>
-            </a:extLst>
-          </p:cNvPr>
-          <p:cNvSpPr txBox="1"/>
-          <p:nvPr/>
-        </p:nvSpPr>
-        <p:spPr>
-          <a:xfrm>
-            <a:off x="5585295" y="3429000"/>
-            <a:ext cx="739305" cy="253916"/>
-          </a:xfrm>
-          <a:prstGeom prst="rect">
-            <a:avLst/>
-          </a:prstGeom>
-          <a:noFill/>
-        </p:spPr>
-        <p:txBody>
-          <a:bodyPr wrap="none" rtlCol="0">
-            <a:spAutoFit/>
-          </a:bodyPr>
-          <a:lstStyle/>
-          <a:p>
-            <a:r>
-              <a:rPr lang="en-SG" sz="1050" dirty="0"/>
-              <a:t>[10 times]</a:t>
-            </a:r>
-          </a:p>
-        </p:txBody>
-      </p:sp>
-      <p:sp>
-        <p:nvSpPr>
-          <p:cNvPr id="71" name="TextBox 70">
-            <a:extLst>
-              <a:ext uri="{FF2B5EF4-FFF2-40B4-BE49-F238E27FC236}">
-                <a16:creationId xmlns:a16="http://schemas.microsoft.com/office/drawing/2014/main" id="{DCD0BA46-768B-462D-8957-C19AC7839DEC}"/>
-              </a:ext>
-            </a:extLst>
-          </p:cNvPr>
-          <p:cNvSpPr txBox="1"/>
-          <p:nvPr/>
-        </p:nvSpPr>
-        <p:spPr>
-          <a:xfrm>
-            <a:off x="5629035" y="3657600"/>
-            <a:ext cx="1305165" cy="253916"/>
-          </a:xfrm>
-          <a:prstGeom prst="rect">
-            <a:avLst/>
-          </a:prstGeom>
-          <a:noFill/>
-        </p:spPr>
-        <p:txBody>
-          <a:bodyPr wrap="none" rtlCol="0">
-            <a:spAutoFit/>
-          </a:bodyPr>
-          <a:lstStyle/>
-          <a:p>
-            <a:r>
-              <a:rPr lang="en-SG" sz="1050" dirty="0" err="1"/>
-              <a:t>imageList.remove</a:t>
-            </a:r>
-            <a:r>
-              <a:rPr lang="en-SG" sz="1050" dirty="0"/>
-              <a:t>(0)</a:t>
-            </a:r>
           </a:p>
         </p:txBody>
       </p:sp>

</xml_diff>